<commit_message>
Added sm stuff n theyr tuff duh (container and contact related real)
</commit_message>
<xml_diff>
--- a/table_list.pptx
+++ b/table_list.pptx
@@ -13,6 +13,9 @@
     <p:sldId id="278" r:id="rId7"/>
     <p:sldId id="279" r:id="rId8"/>
     <p:sldId id="280" r:id="rId9"/>
+    <p:sldId id="281" r:id="rId10"/>
+    <p:sldId id="282" r:id="rId11"/>
+    <p:sldId id="283" r:id="rId12"/>
   </p:sldIdLst>
   <p:sldSz cx="12192000" cy="6858000"/>
   <p:notesSz cx="6858000" cy="9144000"/>
@@ -266,7 +269,7 @@
           <a:p>
             <a:fld id="{2E011DE5-C9EF-4B17-B29E-294153F08EB6}" type="datetimeFigureOut">
               <a:rPr lang="hu-HU" smtClean="0"/>
-              <a:t>2025. 03. 03.</a:t>
+              <a:t>2025. 03. 19.</a:t>
             </a:fld>
             <a:endParaRPr lang="hu-HU"/>
           </a:p>
@@ -464,7 +467,7 @@
           <a:p>
             <a:fld id="{2E011DE5-C9EF-4B17-B29E-294153F08EB6}" type="datetimeFigureOut">
               <a:rPr lang="hu-HU" smtClean="0"/>
-              <a:t>2025. 03. 03.</a:t>
+              <a:t>2025. 03. 19.</a:t>
             </a:fld>
             <a:endParaRPr lang="hu-HU"/>
           </a:p>
@@ -672,7 +675,7 @@
           <a:p>
             <a:fld id="{2E011DE5-C9EF-4B17-B29E-294153F08EB6}" type="datetimeFigureOut">
               <a:rPr lang="hu-HU" smtClean="0"/>
-              <a:t>2025. 03. 03.</a:t>
+              <a:t>2025. 03. 19.</a:t>
             </a:fld>
             <a:endParaRPr lang="hu-HU"/>
           </a:p>
@@ -870,7 +873,7 @@
           <a:p>
             <a:fld id="{2E011DE5-C9EF-4B17-B29E-294153F08EB6}" type="datetimeFigureOut">
               <a:rPr lang="hu-HU" smtClean="0"/>
-              <a:t>2025. 03. 03.</a:t>
+              <a:t>2025. 03. 19.</a:t>
             </a:fld>
             <a:endParaRPr lang="hu-HU"/>
           </a:p>
@@ -1145,7 +1148,7 @@
           <a:p>
             <a:fld id="{2E011DE5-C9EF-4B17-B29E-294153F08EB6}" type="datetimeFigureOut">
               <a:rPr lang="hu-HU" smtClean="0"/>
-              <a:t>2025. 03. 03.</a:t>
+              <a:t>2025. 03. 19.</a:t>
             </a:fld>
             <a:endParaRPr lang="hu-HU"/>
           </a:p>
@@ -1410,7 +1413,7 @@
           <a:p>
             <a:fld id="{2E011DE5-C9EF-4B17-B29E-294153F08EB6}" type="datetimeFigureOut">
               <a:rPr lang="hu-HU" smtClean="0"/>
-              <a:t>2025. 03. 03.</a:t>
+              <a:t>2025. 03. 19.</a:t>
             </a:fld>
             <a:endParaRPr lang="hu-HU"/>
           </a:p>
@@ -1822,7 +1825,7 @@
           <a:p>
             <a:fld id="{2E011DE5-C9EF-4B17-B29E-294153F08EB6}" type="datetimeFigureOut">
               <a:rPr lang="hu-HU" smtClean="0"/>
-              <a:t>2025. 03. 03.</a:t>
+              <a:t>2025. 03. 19.</a:t>
             </a:fld>
             <a:endParaRPr lang="hu-HU"/>
           </a:p>
@@ -1963,7 +1966,7 @@
           <a:p>
             <a:fld id="{2E011DE5-C9EF-4B17-B29E-294153F08EB6}" type="datetimeFigureOut">
               <a:rPr lang="hu-HU" smtClean="0"/>
-              <a:t>2025. 03. 03.</a:t>
+              <a:t>2025. 03. 19.</a:t>
             </a:fld>
             <a:endParaRPr lang="hu-HU"/>
           </a:p>
@@ -2076,7 +2079,7 @@
           <a:p>
             <a:fld id="{2E011DE5-C9EF-4B17-B29E-294153F08EB6}" type="datetimeFigureOut">
               <a:rPr lang="hu-HU" smtClean="0"/>
-              <a:t>2025. 03. 03.</a:t>
+              <a:t>2025. 03. 19.</a:t>
             </a:fld>
             <a:endParaRPr lang="hu-HU"/>
           </a:p>
@@ -2387,7 +2390,7 @@
           <a:p>
             <a:fld id="{2E011DE5-C9EF-4B17-B29E-294153F08EB6}" type="datetimeFigureOut">
               <a:rPr lang="hu-HU" smtClean="0"/>
-              <a:t>2025. 03. 03.</a:t>
+              <a:t>2025. 03. 19.</a:t>
             </a:fld>
             <a:endParaRPr lang="hu-HU"/>
           </a:p>
@@ -2675,7 +2678,7 @@
           <a:p>
             <a:fld id="{2E011DE5-C9EF-4B17-B29E-294153F08EB6}" type="datetimeFigureOut">
               <a:rPr lang="hu-HU" smtClean="0"/>
-              <a:t>2025. 03. 03.</a:t>
+              <a:t>2025. 03. 19.</a:t>
             </a:fld>
             <a:endParaRPr lang="hu-HU"/>
           </a:p>
@@ -2916,7 +2919,7 @@
           <a:p>
             <a:fld id="{2E011DE5-C9EF-4B17-B29E-294153F08EB6}" type="datetimeFigureOut">
               <a:rPr lang="hu-HU" smtClean="0"/>
-              <a:t>2025. 03. 03.</a:t>
+              <a:t>2025. 03. 19.</a:t>
             </a:fld>
             <a:endParaRPr lang="hu-HU"/>
           </a:p>
@@ -3594,6 +3597,461 @@
 </p:sld>
 </file>
 
+<file path=ppt/slides/slide10.xml><?xml version="1.0" encoding="utf-8"?>
+<p:sld xmlns:a="http://schemas.openxmlformats.org/drawingml/2006/main" xmlns:r="http://schemas.openxmlformats.org/officeDocument/2006/relationships" xmlns:p="http://schemas.openxmlformats.org/presentationml/2006/main">
+  <p:cSld>
+    <p:bg>
+      <p:bgPr>
+        <a:solidFill>
+          <a:schemeClr val="accent4">
+            <a:lumMod val="40000"/>
+            <a:lumOff val="60000"/>
+          </a:schemeClr>
+        </a:solidFill>
+        <a:effectLst/>
+      </p:bgPr>
+    </p:bg>
+    <p:spTree>
+      <p:nvGrpSpPr>
+        <p:cNvPr id="1" name=""/>
+        <p:cNvGrpSpPr/>
+        <p:nvPr/>
+      </p:nvGrpSpPr>
+      <p:grpSpPr>
+        <a:xfrm>
+          <a:off x="0" y="0"/>
+          <a:ext cx="0" cy="0"/>
+          <a:chOff x="0" y="0"/>
+          <a:chExt cx="0" cy="0"/>
+        </a:xfrm>
+      </p:grpSpPr>
+      <p:sp>
+        <p:nvSpPr>
+          <p:cNvPr id="2" name="Szövegdoboz 1">
+            <a:extLst>
+              <a:ext uri="{FF2B5EF4-FFF2-40B4-BE49-F238E27FC236}">
+                <a16:creationId xmlns:a16="http://schemas.microsoft.com/office/drawing/2014/main" id="{902A499B-98A4-CFA4-31F1-1A115D0231A0}"/>
+              </a:ext>
+            </a:extLst>
+          </p:cNvPr>
+          <p:cNvSpPr txBox="1"/>
+          <p:nvPr/>
+        </p:nvSpPr>
+        <p:spPr>
+          <a:xfrm>
+            <a:off x="1022683" y="67749"/>
+            <a:ext cx="9733548" cy="584775"/>
+          </a:xfrm>
+          <a:prstGeom prst="rect">
+            <a:avLst/>
+          </a:prstGeom>
+          <a:noFill/>
+        </p:spPr>
+        <p:txBody>
+          <a:bodyPr wrap="square">
+            <a:spAutoFit/>
+          </a:bodyPr>
+          <a:lstStyle/>
+          <a:p>
+            <a:pPr algn="ctr"/>
+            <a:r>
+              <a:rPr lang="it-IT" sz="3200" b="1" dirty="0"/>
+              <a:t>Mi az a hivatkozás (link) a HTML-ben?</a:t>
+            </a:r>
+            <a:r>
+              <a:rPr lang="hu-HU" sz="3200" b="1" dirty="0"/>
+              <a:t> (folytatás)</a:t>
+            </a:r>
+          </a:p>
+        </p:txBody>
+      </p:sp>
+      <p:sp>
+        <p:nvSpPr>
+          <p:cNvPr id="4" name="Szövegdoboz 3">
+            <a:extLst>
+              <a:ext uri="{FF2B5EF4-FFF2-40B4-BE49-F238E27FC236}">
+                <a16:creationId xmlns:a16="http://schemas.microsoft.com/office/drawing/2014/main" id="{0E56B390-2EB2-A44B-6973-F1861C96AF3F}"/>
+              </a:ext>
+            </a:extLst>
+          </p:cNvPr>
+          <p:cNvSpPr txBox="1"/>
+          <p:nvPr/>
+        </p:nvSpPr>
+        <p:spPr>
+          <a:xfrm>
+            <a:off x="253587" y="652524"/>
+            <a:ext cx="11271739" cy="5078313"/>
+          </a:xfrm>
+          <a:prstGeom prst="rect">
+            <a:avLst/>
+          </a:prstGeom>
+          <a:noFill/>
+        </p:spPr>
+        <p:txBody>
+          <a:bodyPr wrap="square">
+            <a:spAutoFit/>
+          </a:bodyPr>
+          <a:lstStyle/>
+          <a:p>
+            <a:pPr algn="just"/>
+            <a:r>
+              <a:rPr lang="hu-HU" dirty="0"/>
+              <a:t>A </a:t>
+            </a:r>
+            <a:r>
+              <a:rPr lang="hu-HU" b="1" dirty="0"/>
+              <a:t>hivatkozás</a:t>
+            </a:r>
+            <a:r>
+              <a:rPr lang="hu-HU" dirty="0"/>
+              <a:t> egy olyan elem a HTML-ben, amely lehetővé teszi, hogy az egyik weboldalról vagy dokumentumból egy másikba navigáljunk. A hivatkozások az &lt;a&gt; (</a:t>
+            </a:r>
+            <a:r>
+              <a:rPr lang="hu-HU" dirty="0" err="1"/>
+              <a:t>anchor</a:t>
+            </a:r>
+            <a:r>
+              <a:rPr lang="hu-HU" dirty="0"/>
+              <a:t>) tag segítségével jönnek létre.</a:t>
+            </a:r>
+          </a:p>
+          <a:p>
+            <a:pPr algn="just"/>
+            <a:endParaRPr lang="hu-HU" dirty="0"/>
+          </a:p>
+          <a:p>
+            <a:pPr algn="just"/>
+            <a:r>
+              <a:rPr lang="hu-HU" b="1" u="sng" dirty="0">
+                <a:solidFill>
+                  <a:srgbClr val="FF0000"/>
+                </a:solidFill>
+              </a:rPr>
+              <a:t>Egyszerű e-mail hivatkozás: </a:t>
+            </a:r>
+          </a:p>
+          <a:p>
+            <a:pPr algn="just"/>
+            <a:r>
+              <a:rPr lang="hu-HU" dirty="0"/>
+              <a:t>1) Alapeset: </a:t>
+            </a:r>
+          </a:p>
+          <a:p>
+            <a:pPr algn="just"/>
+            <a:r>
+              <a:rPr lang="en-US" dirty="0"/>
+              <a:t>&lt;p&gt;&lt;strong&gt;Email:&lt;/strong&gt; </a:t>
+            </a:r>
+            <a:r>
+              <a:rPr lang="en-US" dirty="0">
+                <a:hlinkClick r:id="rId2"/>
+              </a:rPr>
+              <a:t>info@pelda.hu&lt;/p</a:t>
+            </a:r>
+            <a:r>
+              <a:rPr lang="en-US" dirty="0"/>
+              <a:t>&gt;</a:t>
+            </a:r>
+            <a:endParaRPr lang="hu-HU" dirty="0"/>
+          </a:p>
+          <a:p>
+            <a:pPr algn="just"/>
+            <a:endParaRPr lang="hu-HU" dirty="0"/>
+          </a:p>
+          <a:p>
+            <a:pPr algn="just"/>
+            <a:r>
+              <a:rPr lang="hu-HU" dirty="0"/>
+              <a:t>2) Ez az alapmegoldás egy kattintható linket hoz létre, amely megnyitja az alapértelmezett levelezőprogramot (pl. Outlook, </a:t>
+            </a:r>
+            <a:r>
+              <a:rPr lang="hu-HU" dirty="0" err="1"/>
+              <a:t>Gmail</a:t>
+            </a:r>
+            <a:r>
+              <a:rPr lang="hu-HU" dirty="0"/>
+              <a:t>, </a:t>
+            </a:r>
+            <a:r>
+              <a:rPr lang="hu-HU" dirty="0" err="1"/>
+              <a:t>Thunderbird</a:t>
+            </a:r>
+            <a:r>
+              <a:rPr lang="hu-HU" dirty="0"/>
+              <a:t>):</a:t>
+            </a:r>
+          </a:p>
+          <a:p>
+            <a:pPr algn="just"/>
+            <a:r>
+              <a:rPr lang="hu-HU" dirty="0"/>
+              <a:t>&lt;p&gt;&lt;a </a:t>
+            </a:r>
+            <a:r>
+              <a:rPr lang="hu-HU" dirty="0" err="1"/>
+              <a:t>href</a:t>
+            </a:r>
+            <a:r>
+              <a:rPr lang="hu-HU" dirty="0"/>
+              <a:t>="tel:+36301234567"&gt;+36 30 123 4567&lt;/a&gt;&lt;/p&gt;</a:t>
+            </a:r>
+          </a:p>
+          <a:p>
+            <a:pPr algn="just"/>
+            <a:endParaRPr lang="hu-HU" dirty="0"/>
+          </a:p>
+          <a:p>
+            <a:pPr algn="just"/>
+            <a:r>
+              <a:rPr lang="hu-HU" dirty="0"/>
+              <a:t>3) linkbe előre be lehet állítani tárgyat és szöveget is:</a:t>
+            </a:r>
+          </a:p>
+          <a:p>
+            <a:pPr algn="just"/>
+            <a:r>
+              <a:rPr lang="pt-BR" dirty="0"/>
+              <a:t>&lt;a href="mailto:pelda@email.com?subject=Érdeklődés&amp;body=Üdvözlöm!%0D%0AÉrdeklődni szeretnék..."&gt;Küldj e-mailt&lt;/a&gt;</a:t>
+            </a:r>
+            <a:r>
+              <a:rPr lang="hu-HU" dirty="0"/>
+              <a:t> </a:t>
+            </a:r>
+          </a:p>
+          <a:p>
+            <a:pPr algn="just"/>
+            <a:endParaRPr lang="hu-HU" dirty="0"/>
+          </a:p>
+          <a:p>
+            <a:pPr algn="just"/>
+            <a:r>
+              <a:rPr lang="hu-HU" dirty="0"/>
+              <a:t>4) Vagy ikon használatával: </a:t>
+            </a:r>
+          </a:p>
+          <a:p>
+            <a:pPr algn="just"/>
+            <a:r>
+              <a:rPr lang="en-US" dirty="0"/>
+              <a:t>&lt;a </a:t>
+            </a:r>
+            <a:r>
+              <a:rPr lang="en-US" dirty="0" err="1"/>
+              <a:t>href</a:t>
+            </a:r>
+            <a:r>
+              <a:rPr lang="en-US" dirty="0"/>
+              <a:t>="mailto:pelda@email.com"&gt;</a:t>
+            </a:r>
+          </a:p>
+          <a:p>
+            <a:pPr algn="just"/>
+            <a:r>
+              <a:rPr lang="en-US" dirty="0"/>
+              <a:t>    &lt;</a:t>
+            </a:r>
+            <a:r>
+              <a:rPr lang="en-US" dirty="0" err="1"/>
+              <a:t>img</a:t>
+            </a:r>
+            <a:r>
+              <a:rPr lang="en-US" dirty="0"/>
+              <a:t> </a:t>
+            </a:r>
+            <a:r>
+              <a:rPr lang="en-US" dirty="0" err="1"/>
+              <a:t>src</a:t>
+            </a:r>
+            <a:r>
+              <a:rPr lang="en-US" dirty="0"/>
+              <a:t>="images/email-icon.png" alt="Email </a:t>
+            </a:r>
+            <a:r>
+              <a:rPr lang="en-US" dirty="0" err="1"/>
+              <a:t>küldése</a:t>
+            </a:r>
+            <a:r>
+              <a:rPr lang="en-US" dirty="0"/>
+              <a:t>" width="40"&gt;</a:t>
+            </a:r>
+          </a:p>
+        </p:txBody>
+      </p:sp>
+    </p:spTree>
+    <p:extLst>
+      <p:ext uri="{BB962C8B-B14F-4D97-AF65-F5344CB8AC3E}">
+        <p14:creationId xmlns:p14="http://schemas.microsoft.com/office/powerpoint/2010/main" val="3062326239"/>
+      </p:ext>
+    </p:extLst>
+  </p:cSld>
+  <p:clrMapOvr>
+    <a:masterClrMapping/>
+  </p:clrMapOvr>
+</p:sld>
+</file>
+
+<file path=ppt/slides/slide11.xml><?xml version="1.0" encoding="utf-8"?>
+<p:sld xmlns:a="http://schemas.openxmlformats.org/drawingml/2006/main" xmlns:r="http://schemas.openxmlformats.org/officeDocument/2006/relationships" xmlns:p="http://schemas.openxmlformats.org/presentationml/2006/main">
+  <p:cSld>
+    <p:bg>
+      <p:bgPr>
+        <a:solidFill>
+          <a:schemeClr val="accent4">
+            <a:lumMod val="40000"/>
+            <a:lumOff val="60000"/>
+          </a:schemeClr>
+        </a:solidFill>
+        <a:effectLst/>
+      </p:bgPr>
+    </p:bg>
+    <p:spTree>
+      <p:nvGrpSpPr>
+        <p:cNvPr id="1" name=""/>
+        <p:cNvGrpSpPr/>
+        <p:nvPr/>
+      </p:nvGrpSpPr>
+      <p:grpSpPr>
+        <a:xfrm>
+          <a:off x="0" y="0"/>
+          <a:ext cx="0" cy="0"/>
+          <a:chOff x="0" y="0"/>
+          <a:chExt cx="0" cy="0"/>
+        </a:xfrm>
+      </p:grpSpPr>
+      <p:sp>
+        <p:nvSpPr>
+          <p:cNvPr id="5" name="Szövegdoboz 4">
+            <a:extLst>
+              <a:ext uri="{FF2B5EF4-FFF2-40B4-BE49-F238E27FC236}">
+                <a16:creationId xmlns:a16="http://schemas.microsoft.com/office/drawing/2014/main" id="{51CD0DA8-1A1C-6BC5-D962-AEF5D636B8A3}"/>
+              </a:ext>
+            </a:extLst>
+          </p:cNvPr>
+          <p:cNvSpPr txBox="1"/>
+          <p:nvPr/>
+        </p:nvSpPr>
+        <p:spPr>
+          <a:xfrm>
+            <a:off x="533242" y="688836"/>
+            <a:ext cx="11335658" cy="1323439"/>
+          </a:xfrm>
+          <a:prstGeom prst="rect">
+            <a:avLst/>
+          </a:prstGeom>
+          <a:noFill/>
+        </p:spPr>
+        <p:txBody>
+          <a:bodyPr wrap="square">
+            <a:spAutoFit/>
+          </a:bodyPr>
+          <a:lstStyle/>
+          <a:p>
+            <a:pPr algn="just"/>
+            <a:r>
+              <a:rPr lang="hu-HU" sz="2000" dirty="0">
+                <a:sym typeface="Wingdings" panose="05000000000000000000" pitchFamily="2" charset="2"/>
+              </a:rPr>
+              <a:t>A &lt;</a:t>
+            </a:r>
+            <a:r>
+              <a:rPr lang="hu-HU" sz="2000" b="1" dirty="0" err="1">
+                <a:sym typeface="Wingdings" panose="05000000000000000000" pitchFamily="2" charset="2"/>
+              </a:rPr>
+              <a:t>header</a:t>
+            </a:r>
+            <a:r>
+              <a:rPr lang="hu-HU" sz="2000" dirty="0">
+                <a:sym typeface="Wingdings" panose="05000000000000000000" pitchFamily="2" charset="2"/>
+              </a:rPr>
+              <a:t>&gt; egy HTML szemantikus elem, amelyet egy weboldal vagy egy szekció (például egy cikk vagy egy fő rész) fejlécének megadására használunk. Általában tartalmazhat címet, logót, navigációs menüt vagy egyéb bevezető információkat.</a:t>
+            </a:r>
+          </a:p>
+          <a:p>
+            <a:pPr algn="just"/>
+            <a:r>
+              <a:rPr lang="hu-HU" sz="2000" dirty="0">
+                <a:sym typeface="Wingdings" panose="05000000000000000000" pitchFamily="2" charset="2"/>
+              </a:rPr>
+              <a:t>Nem összekeverendő a </a:t>
+            </a:r>
+            <a:r>
+              <a:rPr lang="hu-HU" sz="2000" dirty="0" err="1">
+                <a:sym typeface="Wingdings" panose="05000000000000000000" pitchFamily="2" charset="2"/>
+              </a:rPr>
+              <a:t>head</a:t>
+            </a:r>
+            <a:r>
+              <a:rPr lang="hu-HU" sz="2000" dirty="0">
+                <a:sym typeface="Wingdings" panose="05000000000000000000" pitchFamily="2" charset="2"/>
+              </a:rPr>
+              <a:t> elemmel, mely </a:t>
+            </a:r>
+            <a:r>
+              <a:rPr lang="hu-HU" sz="2000" dirty="0" err="1">
+                <a:sym typeface="Wingdings" panose="05000000000000000000" pitchFamily="2" charset="2"/>
+              </a:rPr>
+              <a:t>metaadatokat</a:t>
+            </a:r>
+            <a:r>
+              <a:rPr lang="hu-HU" sz="2000" dirty="0">
+                <a:sym typeface="Wingdings" panose="05000000000000000000" pitchFamily="2" charset="2"/>
+              </a:rPr>
+              <a:t> tartalmaz.</a:t>
+            </a:r>
+            <a:endParaRPr lang="hu-HU" sz="2000" dirty="0"/>
+          </a:p>
+        </p:txBody>
+      </p:sp>
+      <p:sp>
+        <p:nvSpPr>
+          <p:cNvPr id="7" name="Szövegdoboz 6">
+            <a:extLst>
+              <a:ext uri="{FF2B5EF4-FFF2-40B4-BE49-F238E27FC236}">
+                <a16:creationId xmlns:a16="http://schemas.microsoft.com/office/drawing/2014/main" id="{F9478904-1B9E-B0C6-9E0B-7B6643F9BAE8}"/>
+              </a:ext>
+            </a:extLst>
+          </p:cNvPr>
+          <p:cNvSpPr txBox="1"/>
+          <p:nvPr/>
+        </p:nvSpPr>
+        <p:spPr>
+          <a:xfrm>
+            <a:off x="2868149" y="140100"/>
+            <a:ext cx="6096000" cy="584775"/>
+          </a:xfrm>
+          <a:prstGeom prst="rect">
+            <a:avLst/>
+          </a:prstGeom>
+          <a:noFill/>
+        </p:spPr>
+        <p:txBody>
+          <a:bodyPr wrap="square">
+            <a:spAutoFit/>
+          </a:bodyPr>
+          <a:lstStyle/>
+          <a:p>
+            <a:pPr algn="ctr"/>
+            <a:r>
+              <a:rPr lang="hu-HU" sz="3200" b="1" dirty="0"/>
+              <a:t>HTML</a:t>
+            </a:r>
+          </a:p>
+        </p:txBody>
+      </p:sp>
+    </p:spTree>
+    <p:extLst>
+      <p:ext uri="{BB962C8B-B14F-4D97-AF65-F5344CB8AC3E}">
+        <p14:creationId xmlns:p14="http://schemas.microsoft.com/office/powerpoint/2010/main" val="766185777"/>
+      </p:ext>
+    </p:extLst>
+  </p:cSld>
+  <p:clrMapOvr>
+    <a:masterClrMapping/>
+  </p:clrMapOvr>
+</p:sld>
+</file>
+
 <file path=ppt/slides/slide2.xml><?xml version="1.0" encoding="utf-8"?>
 <p:sld xmlns:a="http://schemas.openxmlformats.org/drawingml/2006/main" xmlns:r="http://schemas.openxmlformats.org/officeDocument/2006/relationships" xmlns:p="http://schemas.openxmlformats.org/presentationml/2006/main">
   <p:cSld>
@@ -5477,8 +5935,8 @@
         </p:nvSpPr>
         <p:spPr>
           <a:xfrm>
-            <a:off x="252143" y="612844"/>
-            <a:ext cx="11271739" cy="6186309"/>
+            <a:off x="204017" y="432371"/>
+            <a:ext cx="11271739" cy="6463308"/>
           </a:xfrm>
           <a:prstGeom prst="rect">
             <a:avLst/>
@@ -5500,11 +5958,19 @@
           <a:p>
             <a:pPr algn="just"/>
             <a:r>
-              <a:rPr lang="hu-HU" b="1" dirty="0" err="1"/>
+              <a:rPr lang="hu-HU" b="1" dirty="0" err="1">
+                <a:solidFill>
+                  <a:srgbClr val="FF0000"/>
+                </a:solidFill>
+              </a:rPr>
               <a:t>Color</a:t>
             </a:r>
             <a:r>
-              <a:rPr lang="hu-HU" b="1" dirty="0"/>
+              <a:rPr lang="hu-HU" b="1" dirty="0">
+                <a:solidFill>
+                  <a:srgbClr val="FF0000"/>
+                </a:solidFill>
+              </a:rPr>
               <a:t>: A szöveg színét állítja be.</a:t>
             </a:r>
           </a:p>
@@ -5576,79 +6042,124 @@
           <a:p>
             <a:pPr algn="just"/>
             <a:r>
-              <a:rPr lang="hu-HU" b="1" dirty="0"/>
+              <a:rPr lang="hu-HU" b="1" dirty="0">
+                <a:solidFill>
+                  <a:srgbClr val="FF0000"/>
+                </a:solidFill>
+              </a:rPr>
               <a:t>font-</a:t>
             </a:r>
             <a:r>
-              <a:rPr lang="hu-HU" b="1" dirty="0" err="1"/>
+              <a:rPr lang="hu-HU" b="1" dirty="0" err="1">
+                <a:solidFill>
+                  <a:srgbClr val="FF0000"/>
+                </a:solidFill>
+              </a:rPr>
               <a:t>size</a:t>
             </a:r>
             <a:r>
-              <a:rPr lang="hu-HU" b="1" dirty="0"/>
+              <a:rPr lang="hu-HU" b="1" dirty="0">
+                <a:solidFill>
+                  <a:srgbClr val="FF0000"/>
+                </a:solidFill>
+              </a:rPr>
               <a:t>: A szöveg méretét határozza meg </a:t>
             </a:r>
             <a:r>
               <a:rPr lang="hu-HU" b="1" dirty="0">
+                <a:solidFill>
+                  <a:srgbClr val="FF0000"/>
+                </a:solidFill>
                 <a:sym typeface="Wingdings" panose="05000000000000000000" pitchFamily="2" charset="2"/>
               </a:rPr>
               <a:t> </a:t>
             </a:r>
             <a:r>
               <a:rPr lang="hu-HU" b="1" dirty="0" err="1">
+                <a:solidFill>
+                  <a:srgbClr val="FF0000"/>
+                </a:solidFill>
                 <a:sym typeface="Wingdings" panose="05000000000000000000" pitchFamily="2" charset="2"/>
               </a:rPr>
               <a:t>px</a:t>
             </a:r>
             <a:r>
               <a:rPr lang="hu-HU" b="1" dirty="0">
+                <a:solidFill>
+                  <a:srgbClr val="FF0000"/>
+                </a:solidFill>
                 <a:sym typeface="Wingdings" panose="05000000000000000000" pitchFamily="2" charset="2"/>
               </a:rPr>
               <a:t>, </a:t>
             </a:r>
             <a:r>
               <a:rPr lang="hu-HU" b="1" dirty="0" err="1">
+                <a:solidFill>
+                  <a:srgbClr val="FF0000"/>
+                </a:solidFill>
                 <a:sym typeface="Wingdings" panose="05000000000000000000" pitchFamily="2" charset="2"/>
               </a:rPr>
               <a:t>em</a:t>
             </a:r>
             <a:r>
               <a:rPr lang="hu-HU" b="1" dirty="0">
+                <a:solidFill>
+                  <a:srgbClr val="FF0000"/>
+                </a:solidFill>
                 <a:sym typeface="Wingdings" panose="05000000000000000000" pitchFamily="2" charset="2"/>
               </a:rPr>
               <a:t>, </a:t>
             </a:r>
             <a:r>
               <a:rPr lang="hu-HU" b="1" dirty="0" err="1">
+                <a:solidFill>
+                  <a:srgbClr val="FF0000"/>
+                </a:solidFill>
                 <a:sym typeface="Wingdings" panose="05000000000000000000" pitchFamily="2" charset="2"/>
               </a:rPr>
               <a:t>rem</a:t>
             </a:r>
             <a:r>
               <a:rPr lang="hu-HU" b="1" dirty="0">
+                <a:solidFill>
+                  <a:srgbClr val="FF0000"/>
+                </a:solidFill>
                 <a:sym typeface="Wingdings" panose="05000000000000000000" pitchFamily="2" charset="2"/>
               </a:rPr>
               <a:t>, %, </a:t>
             </a:r>
             <a:r>
               <a:rPr lang="hu-HU" b="1" dirty="0" err="1">
+                <a:solidFill>
+                  <a:srgbClr val="FF0000"/>
+                </a:solidFill>
                 <a:sym typeface="Wingdings" panose="05000000000000000000" pitchFamily="2" charset="2"/>
               </a:rPr>
               <a:t>vw</a:t>
             </a:r>
             <a:r>
               <a:rPr lang="hu-HU" b="1" dirty="0">
+                <a:solidFill>
+                  <a:srgbClr val="FF0000"/>
+                </a:solidFill>
                 <a:sym typeface="Wingdings" panose="05000000000000000000" pitchFamily="2" charset="2"/>
               </a:rPr>
               <a:t>, </a:t>
             </a:r>
             <a:r>
               <a:rPr lang="hu-HU" b="1" dirty="0" err="1">
+                <a:solidFill>
+                  <a:srgbClr val="FF0000"/>
+                </a:solidFill>
                 <a:sym typeface="Wingdings" panose="05000000000000000000" pitchFamily="2" charset="2"/>
               </a:rPr>
               <a:t>vh</a:t>
             </a:r>
             <a:r>
               <a:rPr lang="hu-HU" b="1" dirty="0">
+                <a:solidFill>
+                  <a:srgbClr val="FF0000"/>
+                </a:solidFill>
                 <a:sym typeface="Wingdings" panose="05000000000000000000" pitchFamily="2" charset="2"/>
               </a:rPr>
               <a:t> mértékegységekkel</a:t>
@@ -5687,15 +6198,27 @@
           <a:p>
             <a:pPr algn="just"/>
             <a:r>
-              <a:rPr lang="hu-HU" b="1" dirty="0"/>
+              <a:rPr lang="hu-HU" b="1" dirty="0">
+                <a:solidFill>
+                  <a:srgbClr val="FF0000"/>
+                </a:solidFill>
+              </a:rPr>
               <a:t>font-</a:t>
             </a:r>
             <a:r>
-              <a:rPr lang="hu-HU" b="1" dirty="0" err="1"/>
+              <a:rPr lang="hu-HU" b="1" dirty="0" err="1">
+                <a:solidFill>
+                  <a:srgbClr val="FF0000"/>
+                </a:solidFill>
+              </a:rPr>
               <a:t>family</a:t>
             </a:r>
             <a:r>
-              <a:rPr lang="hu-HU" b="1" dirty="0"/>
+              <a:rPr lang="hu-HU" b="1" dirty="0">
+                <a:solidFill>
+                  <a:srgbClr val="FF0000"/>
+                </a:solidFill>
+              </a:rPr>
               <a:t>: A szöveg betűtípusát (fontját) adja meg.</a:t>
             </a:r>
           </a:p>
@@ -5717,15 +6240,27 @@
           <a:p>
             <a:pPr algn="just"/>
             <a:r>
-              <a:rPr lang="hu-HU" b="1" dirty="0"/>
+              <a:rPr lang="hu-HU" b="1" dirty="0">
+                <a:solidFill>
+                  <a:srgbClr val="FF0000"/>
+                </a:solidFill>
+              </a:rPr>
               <a:t>font-</a:t>
             </a:r>
             <a:r>
-              <a:rPr lang="hu-HU" b="1" dirty="0" err="1"/>
+              <a:rPr lang="hu-HU" b="1" dirty="0" err="1">
+                <a:solidFill>
+                  <a:srgbClr val="FF0000"/>
+                </a:solidFill>
+              </a:rPr>
               <a:t>weight</a:t>
             </a:r>
             <a:r>
-              <a:rPr lang="hu-HU" b="1" dirty="0"/>
+              <a:rPr lang="hu-HU" b="1" dirty="0">
+                <a:solidFill>
+                  <a:srgbClr val="FF0000"/>
+                </a:solidFill>
+              </a:rPr>
               <a:t>: A szöveg vastagságát állítja be.</a:t>
             </a:r>
           </a:p>
@@ -5770,50 +6305,94 @@
           <a:p>
             <a:pPr algn="just"/>
             <a:r>
-              <a:rPr lang="hu-HU" b="1" dirty="0"/>
+              <a:rPr lang="hu-HU" b="1" dirty="0">
+                <a:solidFill>
+                  <a:srgbClr val="FF0000"/>
+                </a:solidFill>
+              </a:rPr>
               <a:t>font-</a:t>
             </a:r>
             <a:r>
-              <a:rPr lang="hu-HU" b="1" dirty="0" err="1"/>
+              <a:rPr lang="hu-HU" b="1" dirty="0" err="1">
+                <a:solidFill>
+                  <a:srgbClr val="FF0000"/>
+                </a:solidFill>
+              </a:rPr>
               <a:t>style</a:t>
             </a:r>
             <a:r>
-              <a:rPr lang="hu-HU" b="1" dirty="0"/>
+              <a:rPr lang="hu-HU" b="1" dirty="0">
+                <a:solidFill>
+                  <a:srgbClr val="FF0000"/>
+                </a:solidFill>
+              </a:rPr>
               <a:t>: A szöveget dőlt (</a:t>
             </a:r>
             <a:r>
-              <a:rPr lang="hu-HU" b="1" dirty="0" err="1"/>
+              <a:rPr lang="hu-HU" b="1" dirty="0" err="1">
+                <a:solidFill>
+                  <a:srgbClr val="FF0000"/>
+                </a:solidFill>
+              </a:rPr>
               <a:t>italic</a:t>
             </a:r>
             <a:r>
-              <a:rPr lang="hu-HU" b="1" dirty="0"/>
+              <a:rPr lang="hu-HU" b="1" dirty="0">
+                <a:solidFill>
+                  <a:srgbClr val="FF0000"/>
+                </a:solidFill>
+              </a:rPr>
               <a:t>) vagy normál (</a:t>
             </a:r>
             <a:r>
-              <a:rPr lang="hu-HU" b="1" dirty="0" err="1"/>
+              <a:rPr lang="hu-HU" b="1" dirty="0" err="1">
+                <a:solidFill>
+                  <a:srgbClr val="FF0000"/>
+                </a:solidFill>
+              </a:rPr>
               <a:t>normal</a:t>
             </a:r>
             <a:r>
-              <a:rPr lang="hu-HU" b="1" dirty="0"/>
+              <a:rPr lang="hu-HU" b="1" dirty="0">
+                <a:solidFill>
+                  <a:srgbClr val="FF0000"/>
+                </a:solidFill>
+              </a:rPr>
               <a:t>) módba állítja.</a:t>
             </a:r>
           </a:p>
           <a:p>
             <a:pPr algn="just"/>
             <a:r>
-              <a:rPr lang="hu-HU" b="1" dirty="0"/>
+              <a:rPr lang="hu-HU" b="1" dirty="0">
+                <a:solidFill>
+                  <a:srgbClr val="FF0000"/>
+                </a:solidFill>
+              </a:rPr>
               <a:t>text-</a:t>
             </a:r>
             <a:r>
-              <a:rPr lang="hu-HU" b="1" dirty="0" err="1"/>
+              <a:rPr lang="hu-HU" b="1" dirty="0" err="1">
+                <a:solidFill>
+                  <a:srgbClr val="FF0000"/>
+                </a:solidFill>
+              </a:rPr>
               <a:t>align</a:t>
             </a:r>
             <a:r>
-              <a:rPr lang="hu-HU" b="1" dirty="0"/>
+              <a:rPr lang="hu-HU" b="1" dirty="0">
+                <a:solidFill>
+                  <a:srgbClr val="FF0000"/>
+                </a:solidFill>
+              </a:rPr>
               <a:t>: A szöveg vízszintes igazítását szabályozza</a:t>
             </a:r>
             <a:r>
-              <a:rPr lang="hu-HU" dirty="0"/>
+              <a:rPr lang="hu-HU" dirty="0">
+                <a:solidFill>
+                  <a:srgbClr val="FF0000"/>
+                </a:solidFill>
+              </a:rPr>
               <a:t>.</a:t>
             </a:r>
           </a:p>
@@ -5904,15 +6483,27 @@
           <a:p>
             <a:pPr algn="just"/>
             <a:r>
-              <a:rPr lang="hu-HU" b="1" dirty="0"/>
+              <a:rPr lang="hu-HU" b="1" dirty="0">
+                <a:solidFill>
+                  <a:srgbClr val="FF0000"/>
+                </a:solidFill>
+              </a:rPr>
               <a:t>text-</a:t>
             </a:r>
             <a:r>
-              <a:rPr lang="hu-HU" b="1" dirty="0" err="1"/>
+              <a:rPr lang="hu-HU" b="1" dirty="0" err="1">
+                <a:solidFill>
+                  <a:srgbClr val="FF0000"/>
+                </a:solidFill>
+              </a:rPr>
               <a:t>shadow</a:t>
             </a:r>
             <a:r>
-              <a:rPr lang="hu-HU" b="1" dirty="0"/>
+              <a:rPr lang="hu-HU" b="1" dirty="0">
+                <a:solidFill>
+                  <a:srgbClr val="FF0000"/>
+                </a:solidFill>
+              </a:rPr>
               <a:t>: A szöveg mögé árnyékot ad</a:t>
             </a:r>
           </a:p>
@@ -5944,7 +6535,31 @@
             </a:r>
             <a:r>
               <a:rPr lang="hu-HU" dirty="0"/>
-              <a:t>(0, 0, 0, 0.5);</a:t>
+              <a:t>(0, 0, 0, 0.5); /*</a:t>
+            </a:r>
+            <a:r>
+              <a:rPr lang="hu-HU" b="1" dirty="0"/>
+              <a:t>X-eltolás</a:t>
+            </a:r>
+            <a:r>
+              <a:rPr lang="hu-HU" dirty="0"/>
+              <a:t> (vízszintes irány), </a:t>
+            </a:r>
+            <a:r>
+              <a:rPr lang="hu-HU" b="1" dirty="0"/>
+              <a:t>Y-eltolás</a:t>
+            </a:r>
+            <a:r>
+              <a:rPr lang="hu-HU" dirty="0"/>
+              <a:t> (függőleges irány), homályosabb hatás, </a:t>
+            </a:r>
+            <a:r>
+              <a:rPr lang="hu-HU" dirty="0" err="1"/>
+              <a:t>itt:fekete</a:t>
+            </a:r>
+            <a:r>
+              <a:rPr lang="hu-HU" dirty="0"/>
+              <a:t>, 50%-os átlátszósággal. */</a:t>
             </a:r>
           </a:p>
         </p:txBody>
@@ -5953,6 +6568,350 @@
     <p:extLst>
       <p:ext uri="{BB962C8B-B14F-4D97-AF65-F5344CB8AC3E}">
         <p14:creationId xmlns:p14="http://schemas.microsoft.com/office/powerpoint/2010/main" val="3319710537"/>
+      </p:ext>
+    </p:extLst>
+  </p:cSld>
+  <p:clrMapOvr>
+    <a:masterClrMapping/>
+  </p:clrMapOvr>
+</p:sld>
+</file>
+
+<file path=ppt/slides/slide9.xml><?xml version="1.0" encoding="utf-8"?>
+<p:sld xmlns:a="http://schemas.openxmlformats.org/drawingml/2006/main" xmlns:r="http://schemas.openxmlformats.org/officeDocument/2006/relationships" xmlns:p="http://schemas.openxmlformats.org/presentationml/2006/main">
+  <p:cSld>
+    <p:bg>
+      <p:bgPr>
+        <a:solidFill>
+          <a:schemeClr val="accent4">
+            <a:lumMod val="40000"/>
+            <a:lumOff val="60000"/>
+          </a:schemeClr>
+        </a:solidFill>
+        <a:effectLst/>
+      </p:bgPr>
+    </p:bg>
+    <p:spTree>
+      <p:nvGrpSpPr>
+        <p:cNvPr id="1" name=""/>
+        <p:cNvGrpSpPr/>
+        <p:nvPr/>
+      </p:nvGrpSpPr>
+      <p:grpSpPr>
+        <a:xfrm>
+          <a:off x="0" y="0"/>
+          <a:ext cx="0" cy="0"/>
+          <a:chOff x="0" y="0"/>
+          <a:chExt cx="0" cy="0"/>
+        </a:xfrm>
+      </p:grpSpPr>
+      <p:sp>
+        <p:nvSpPr>
+          <p:cNvPr id="2" name="Szövegdoboz 1">
+            <a:extLst>
+              <a:ext uri="{FF2B5EF4-FFF2-40B4-BE49-F238E27FC236}">
+                <a16:creationId xmlns:a16="http://schemas.microsoft.com/office/drawing/2014/main" id="{902A499B-98A4-CFA4-31F1-1A115D0231A0}"/>
+              </a:ext>
+            </a:extLst>
+          </p:cNvPr>
+          <p:cNvSpPr txBox="1"/>
+          <p:nvPr/>
+        </p:nvSpPr>
+        <p:spPr>
+          <a:xfrm>
+            <a:off x="1022683" y="67749"/>
+            <a:ext cx="9733548" cy="584775"/>
+          </a:xfrm>
+          <a:prstGeom prst="rect">
+            <a:avLst/>
+          </a:prstGeom>
+          <a:noFill/>
+        </p:spPr>
+        <p:txBody>
+          <a:bodyPr wrap="square">
+            <a:spAutoFit/>
+          </a:bodyPr>
+          <a:lstStyle/>
+          <a:p>
+            <a:pPr algn="ctr"/>
+            <a:r>
+              <a:rPr lang="it-IT" sz="3200" b="1" dirty="0"/>
+              <a:t>Mi az a hivatkozás (link) a HTML-ben?</a:t>
+            </a:r>
+            <a:r>
+              <a:rPr lang="hu-HU" sz="3200" b="1" dirty="0"/>
+              <a:t> (folytatás)</a:t>
+            </a:r>
+          </a:p>
+        </p:txBody>
+      </p:sp>
+      <p:sp>
+        <p:nvSpPr>
+          <p:cNvPr id="4" name="Szövegdoboz 3">
+            <a:extLst>
+              <a:ext uri="{FF2B5EF4-FFF2-40B4-BE49-F238E27FC236}">
+                <a16:creationId xmlns:a16="http://schemas.microsoft.com/office/drawing/2014/main" id="{0E56B390-2EB2-A44B-6973-F1861C96AF3F}"/>
+              </a:ext>
+            </a:extLst>
+          </p:cNvPr>
+          <p:cNvSpPr txBox="1"/>
+          <p:nvPr/>
+        </p:nvSpPr>
+        <p:spPr>
+          <a:xfrm>
+            <a:off x="253587" y="652524"/>
+            <a:ext cx="11271739" cy="5909310"/>
+          </a:xfrm>
+          <a:prstGeom prst="rect">
+            <a:avLst/>
+          </a:prstGeom>
+          <a:noFill/>
+        </p:spPr>
+        <p:txBody>
+          <a:bodyPr wrap="square">
+            <a:spAutoFit/>
+          </a:bodyPr>
+          <a:lstStyle/>
+          <a:p>
+            <a:pPr algn="just"/>
+            <a:r>
+              <a:rPr lang="hu-HU" dirty="0"/>
+              <a:t>A </a:t>
+            </a:r>
+            <a:r>
+              <a:rPr lang="hu-HU" b="1" dirty="0"/>
+              <a:t>hivatkozás</a:t>
+            </a:r>
+            <a:r>
+              <a:rPr lang="hu-HU" dirty="0"/>
+              <a:t> egy olyan elem a HTML-ben, amely lehetővé teszi, hogy az egyik weboldalról vagy dokumentumból egy másikba navigáljunk. A hivatkozások az &lt;a&gt; (</a:t>
+            </a:r>
+            <a:r>
+              <a:rPr lang="hu-HU" dirty="0" err="1"/>
+              <a:t>anchor</a:t>
+            </a:r>
+            <a:r>
+              <a:rPr lang="hu-HU" dirty="0"/>
+              <a:t>) tag segítségével jönnek létre.</a:t>
+            </a:r>
+          </a:p>
+          <a:p>
+            <a:pPr algn="just"/>
+            <a:endParaRPr lang="hu-HU" dirty="0"/>
+          </a:p>
+          <a:p>
+            <a:pPr algn="just"/>
+            <a:r>
+              <a:rPr lang="hu-HU" b="1" u="sng" dirty="0">
+                <a:solidFill>
+                  <a:srgbClr val="FF0000"/>
+                </a:solidFill>
+              </a:rPr>
+              <a:t>A tel: protokollal ellátott hivatkozást telefonhivatkozásnak vagy telefonlinknek nevezzük:</a:t>
+            </a:r>
+          </a:p>
+          <a:p>
+            <a:pPr algn="just"/>
+            <a:r>
+              <a:rPr lang="hu-HU" dirty="0"/>
+              <a:t>&lt;p&gt;&lt;a </a:t>
+            </a:r>
+            <a:r>
+              <a:rPr lang="hu-HU" dirty="0" err="1"/>
+              <a:t>href</a:t>
+            </a:r>
+            <a:r>
+              <a:rPr lang="hu-HU" dirty="0"/>
+              <a:t>="tel:+36301234567"&gt;+36 30 123 4567&lt;/a&gt;&lt;/p&gt;</a:t>
+            </a:r>
+          </a:p>
+          <a:p>
+            <a:pPr algn="just"/>
+            <a:endParaRPr lang="hu-HU" dirty="0"/>
+          </a:p>
+          <a:p>
+            <a:pPr algn="just"/>
+            <a:r>
+              <a:rPr lang="hu-HU" dirty="0"/>
+              <a:t>Vagy ikon használatával: </a:t>
+            </a:r>
+          </a:p>
+          <a:p>
+            <a:pPr algn="just"/>
+            <a:r>
+              <a:rPr lang="en-US" dirty="0"/>
+              <a:t>&lt;a </a:t>
+            </a:r>
+            <a:r>
+              <a:rPr lang="en-US" dirty="0" err="1"/>
+              <a:t>href</a:t>
+            </a:r>
+            <a:r>
+              <a:rPr lang="en-US" dirty="0"/>
+              <a:t>="</a:t>
+            </a:r>
+            <a:r>
+              <a:rPr lang="en-US" dirty="0" err="1"/>
+              <a:t>tel</a:t>
+            </a:r>
+            <a:r>
+              <a:rPr lang="en-US" dirty="0"/>
+              <a:t>:+36301234567"&gt;</a:t>
+            </a:r>
+          </a:p>
+          <a:p>
+            <a:pPr algn="just"/>
+            <a:r>
+              <a:rPr lang="en-US" dirty="0"/>
+              <a:t>                        &lt;</a:t>
+            </a:r>
+            <a:r>
+              <a:rPr lang="en-US" dirty="0" err="1"/>
+              <a:t>img</a:t>
+            </a:r>
+            <a:r>
+              <a:rPr lang="en-US" dirty="0"/>
+              <a:t> </a:t>
+            </a:r>
+            <a:r>
+              <a:rPr lang="en-US" dirty="0" err="1"/>
+              <a:t>src</a:t>
+            </a:r>
+            <a:r>
+              <a:rPr lang="en-US" dirty="0"/>
+              <a:t>="telephone2.gif" alt="</a:t>
+            </a:r>
+            <a:r>
+              <a:rPr lang="en-US" dirty="0" err="1"/>
+              <a:t>Hívás</a:t>
+            </a:r>
+            <a:r>
+              <a:rPr lang="en-US" dirty="0"/>
+              <a:t>"&gt;</a:t>
+            </a:r>
+          </a:p>
+          <a:p>
+            <a:pPr algn="just"/>
+            <a:r>
+              <a:rPr lang="en-US" dirty="0"/>
+              <a:t>                    &lt;/a&gt;</a:t>
+            </a:r>
+            <a:endParaRPr lang="hu-HU" dirty="0"/>
+          </a:p>
+          <a:p>
+            <a:pPr algn="just"/>
+            <a:r>
+              <a:rPr lang="hu-HU" dirty="0"/>
+              <a:t>Alapértelmezettként a Skype, Microsoft </a:t>
+            </a:r>
+            <a:r>
+              <a:rPr lang="hu-HU" dirty="0" err="1"/>
+              <a:t>Teams</a:t>
+            </a:r>
+            <a:r>
+              <a:rPr lang="hu-HU" dirty="0"/>
+              <a:t> vagy egy másik telepített </a:t>
+            </a:r>
+            <a:r>
+              <a:rPr lang="hu-HU" dirty="0" err="1"/>
+              <a:t>VoIP</a:t>
+            </a:r>
+            <a:r>
+              <a:rPr lang="hu-HU" dirty="0"/>
+              <a:t> alkalmazás (pl. Zoom) próbálja megnyitni.</a:t>
+            </a:r>
+          </a:p>
+          <a:p>
+            <a:pPr algn="just"/>
+            <a:r>
+              <a:rPr lang="hu-HU" dirty="0"/>
+              <a:t>Ez a fajta hivatkozás különösen hasznos mobilbarát weboldalaknál, mivel az okostelefon-felhasználók egyetlen kattintással hívást indíthatnak.</a:t>
+            </a:r>
+          </a:p>
+          <a:p>
+            <a:pPr algn="just"/>
+            <a:endParaRPr lang="hu-HU" dirty="0"/>
+          </a:p>
+          <a:p>
+            <a:pPr algn="just"/>
+            <a:r>
+              <a:rPr lang="hu-HU" dirty="0"/>
+              <a:t>Ikon letölthető pl.:</a:t>
+            </a:r>
+          </a:p>
+          <a:p>
+            <a:pPr algn="just"/>
+            <a:r>
+              <a:rPr lang="hu-HU" dirty="0">
+                <a:hlinkClick r:id="rId2"/>
+              </a:rPr>
+              <a:t>https://icons8.com/icons/set/phone--white</a:t>
+            </a:r>
+            <a:endParaRPr lang="hu-HU" dirty="0"/>
+          </a:p>
+          <a:p>
+            <a:pPr algn="just"/>
+            <a:endParaRPr lang="hu-HU" dirty="0"/>
+          </a:p>
+          <a:p>
+            <a:pPr algn="just"/>
+            <a:r>
+              <a:rPr lang="hu-HU" dirty="0"/>
+              <a:t>Ezzel kapcsolatban, de általánosságban is fontos oldal a </a:t>
+            </a:r>
+            <a:r>
+              <a:rPr lang="hu-HU" b="1" dirty="0" err="1"/>
+              <a:t>stackoverflow</a:t>
+            </a:r>
+            <a:r>
+              <a:rPr lang="hu-HU" dirty="0"/>
+              <a:t>: </a:t>
+            </a:r>
+            <a:r>
+              <a:rPr lang="hu-HU" dirty="0" err="1"/>
+              <a:t>pl</a:t>
+            </a:r>
+            <a:r>
+              <a:rPr lang="hu-HU" dirty="0"/>
+              <a:t>: a fenti témában: </a:t>
+            </a:r>
+            <a:r>
+              <a:rPr lang="hu-HU" dirty="0">
+                <a:sym typeface="Wingdings" panose="05000000000000000000" pitchFamily="2" charset="2"/>
+              </a:rPr>
+              <a:t> szerzői jogok &lt;-&gt; </a:t>
+            </a:r>
+            <a:r>
+              <a:rPr lang="hu-HU" dirty="0" err="1">
+                <a:sym typeface="Wingdings" panose="05000000000000000000" pitchFamily="2" charset="2"/>
+              </a:rPr>
+              <a:t>chatGPT</a:t>
+            </a:r>
+            <a:endParaRPr lang="hu-HU" dirty="0"/>
+          </a:p>
+          <a:p>
+            <a:pPr algn="just"/>
+            <a:r>
+              <a:rPr lang="hu-HU" dirty="0">
+                <a:hlinkClick r:id="rId3"/>
+              </a:rPr>
+              <a:t>https://stackoverflow.com/questions/17219688/href-tel-and-mobile-numbers</a:t>
+            </a:r>
+            <a:endParaRPr lang="hu-HU" dirty="0"/>
+          </a:p>
+          <a:p>
+            <a:pPr algn="just"/>
+            <a:r>
+              <a:rPr lang="hu-HU" dirty="0"/>
+              <a:t>vagy https://www.w3schools.com/tags/tryit.asp?filename=tryhtml_link_mailto</a:t>
+            </a:r>
+          </a:p>
+        </p:txBody>
+      </p:sp>
+    </p:spTree>
+    <p:extLst>
+      <p:ext uri="{BB962C8B-B14F-4D97-AF65-F5344CB8AC3E}">
+        <p14:creationId xmlns:p14="http://schemas.microsoft.com/office/powerpoint/2010/main" val="1729625635"/>
       </p:ext>
     </p:extLst>
   </p:cSld>

</xml_diff>